<commit_message>
reach more than 90% with 4 classes
</commit_message>
<xml_diff>
--- a/REsults.pptx
+++ b/REsults.pptx
@@ -8,6 +8,8 @@
     <p:sldId id="256" r:id="rId2"/>
     <p:sldId id="257" r:id="rId3"/>
     <p:sldId id="258" r:id="rId4"/>
+    <p:sldId id="259" r:id="rId5"/>
+    <p:sldId id="260" r:id="rId6"/>
   </p:sldIdLst>
   <p:sldSz cx="12192000" cy="6858000"/>
   <p:notesSz cx="6858000" cy="9144000"/>
@@ -106,6 +108,11 @@
       </a:defRPr>
     </a:lvl9pPr>
   </p:defaultTextStyle>
+  <p:extLst>
+    <p:ext uri="{EFAFB233-063F-42B5-8137-9DF3F51BA10A}">
+      <p15:sldGuideLst xmlns:p15="http://schemas.microsoft.com/office/powerpoint/2012/main"/>
+    </p:ext>
+  </p:extLst>
 </p:presentation>
 </file>
 
@@ -258,7 +265,7 @@
           <a:p>
             <a:fld id="{91802373-E2A4-4214-8D52-AAEBA38B6C24}" type="datetimeFigureOut">
               <a:rPr lang="en-SG" smtClean="0"/>
-              <a:t>9/3/2021</a:t>
+              <a:t>12/3/2021</a:t>
             </a:fld>
             <a:endParaRPr lang="en-SG"/>
           </a:p>
@@ -458,7 +465,7 @@
           <a:p>
             <a:fld id="{91802373-E2A4-4214-8D52-AAEBA38B6C24}" type="datetimeFigureOut">
               <a:rPr lang="en-SG" smtClean="0"/>
-              <a:t>9/3/2021</a:t>
+              <a:t>12/3/2021</a:t>
             </a:fld>
             <a:endParaRPr lang="en-SG"/>
           </a:p>
@@ -668,7 +675,7 @@
           <a:p>
             <a:fld id="{91802373-E2A4-4214-8D52-AAEBA38B6C24}" type="datetimeFigureOut">
               <a:rPr lang="en-SG" smtClean="0"/>
-              <a:t>9/3/2021</a:t>
+              <a:t>12/3/2021</a:t>
             </a:fld>
             <a:endParaRPr lang="en-SG"/>
           </a:p>
@@ -868,7 +875,7 @@
           <a:p>
             <a:fld id="{91802373-E2A4-4214-8D52-AAEBA38B6C24}" type="datetimeFigureOut">
               <a:rPr lang="en-SG" smtClean="0"/>
-              <a:t>9/3/2021</a:t>
+              <a:t>12/3/2021</a:t>
             </a:fld>
             <a:endParaRPr lang="en-SG"/>
           </a:p>
@@ -1144,7 +1151,7 @@
           <a:p>
             <a:fld id="{91802373-E2A4-4214-8D52-AAEBA38B6C24}" type="datetimeFigureOut">
               <a:rPr lang="en-SG" smtClean="0"/>
-              <a:t>9/3/2021</a:t>
+              <a:t>12/3/2021</a:t>
             </a:fld>
             <a:endParaRPr lang="en-SG"/>
           </a:p>
@@ -1412,7 +1419,7 @@
           <a:p>
             <a:fld id="{91802373-E2A4-4214-8D52-AAEBA38B6C24}" type="datetimeFigureOut">
               <a:rPr lang="en-SG" smtClean="0"/>
-              <a:t>9/3/2021</a:t>
+              <a:t>12/3/2021</a:t>
             </a:fld>
             <a:endParaRPr lang="en-SG"/>
           </a:p>
@@ -1827,7 +1834,7 @@
           <a:p>
             <a:fld id="{91802373-E2A4-4214-8D52-AAEBA38B6C24}" type="datetimeFigureOut">
               <a:rPr lang="en-SG" smtClean="0"/>
-              <a:t>9/3/2021</a:t>
+              <a:t>12/3/2021</a:t>
             </a:fld>
             <a:endParaRPr lang="en-SG"/>
           </a:p>
@@ -1969,7 +1976,7 @@
           <a:p>
             <a:fld id="{91802373-E2A4-4214-8D52-AAEBA38B6C24}" type="datetimeFigureOut">
               <a:rPr lang="en-SG" smtClean="0"/>
-              <a:t>9/3/2021</a:t>
+              <a:t>12/3/2021</a:t>
             </a:fld>
             <a:endParaRPr lang="en-SG"/>
           </a:p>
@@ -2082,7 +2089,7 @@
           <a:p>
             <a:fld id="{91802373-E2A4-4214-8D52-AAEBA38B6C24}" type="datetimeFigureOut">
               <a:rPr lang="en-SG" smtClean="0"/>
-              <a:t>9/3/2021</a:t>
+              <a:t>12/3/2021</a:t>
             </a:fld>
             <a:endParaRPr lang="en-SG"/>
           </a:p>
@@ -2395,7 +2402,7 @@
           <a:p>
             <a:fld id="{91802373-E2A4-4214-8D52-AAEBA38B6C24}" type="datetimeFigureOut">
               <a:rPr lang="en-SG" smtClean="0"/>
-              <a:t>9/3/2021</a:t>
+              <a:t>12/3/2021</a:t>
             </a:fld>
             <a:endParaRPr lang="en-SG"/>
           </a:p>
@@ -2684,7 +2691,7 @@
           <a:p>
             <a:fld id="{91802373-E2A4-4214-8D52-AAEBA38B6C24}" type="datetimeFigureOut">
               <a:rPr lang="en-SG" smtClean="0"/>
-              <a:t>9/3/2021</a:t>
+              <a:t>12/3/2021</a:t>
             </a:fld>
             <a:endParaRPr lang="en-SG"/>
           </a:p>
@@ -2927,7 +2934,7 @@
           <a:p>
             <a:fld id="{91802373-E2A4-4214-8D52-AAEBA38B6C24}" type="datetimeFigureOut">
               <a:rPr lang="en-SG" smtClean="0"/>
-              <a:t>9/3/2021</a:t>
+              <a:t>12/3/2021</a:t>
             </a:fld>
             <a:endParaRPr lang="en-SG"/>
           </a:p>
@@ -3617,6 +3624,305 @@
 </p:sld>
 </file>
 
+<file path=ppt/slides/slide4.xml><?xml version="1.0" encoding="utf-8"?>
+<p:sld xmlns:a="http://schemas.openxmlformats.org/drawingml/2006/main" xmlns:r="http://schemas.openxmlformats.org/officeDocument/2006/relationships" xmlns:p="http://schemas.openxmlformats.org/presentationml/2006/main">
+  <p:cSld>
+    <p:spTree>
+      <p:nvGrpSpPr>
+        <p:cNvPr id="1" name=""/>
+        <p:cNvGrpSpPr/>
+        <p:nvPr/>
+      </p:nvGrpSpPr>
+      <p:grpSpPr>
+        <a:xfrm>
+          <a:off x="0" y="0"/>
+          <a:ext cx="0" cy="0"/>
+          <a:chOff x="0" y="0"/>
+          <a:chExt cx="0" cy="0"/>
+        </a:xfrm>
+      </p:grpSpPr>
+      <p:sp>
+        <p:nvSpPr>
+          <p:cNvPr id="2" name="Title 1">
+            <a:extLst>
+              <a:ext uri="{FF2B5EF4-FFF2-40B4-BE49-F238E27FC236}">
+                <a16:creationId xmlns:a16="http://schemas.microsoft.com/office/drawing/2014/main" id="{AB471DFF-1539-41FE-A800-121BCE7DD671}"/>
+              </a:ext>
+            </a:extLst>
+          </p:cNvPr>
+          <p:cNvSpPr>
+            <a:spLocks noGrp="1"/>
+          </p:cNvSpPr>
+          <p:nvPr>
+            <p:ph type="title"/>
+          </p:nvPr>
+        </p:nvSpPr>
+        <p:spPr>
+          <a:xfrm>
+            <a:off x="838200" y="365125"/>
+            <a:ext cx="10515600" cy="2272058"/>
+          </a:xfrm>
+        </p:spPr>
+        <p:txBody>
+          <a:bodyPr>
+            <a:normAutofit/>
+          </a:bodyPr>
+          <a:lstStyle/>
+          <a:p>
+            <a:r>
+              <a:rPr lang="en-US" dirty="0"/>
+              <a:t>Res18 with 4 classes</a:t>
+            </a:r>
+            <a:br>
+              <a:rPr lang="en-US" dirty="0"/>
+            </a:br>
+            <a:r>
+              <a:rPr lang="en-US" dirty="0"/>
+              <a:t>left 1100</a:t>
+            </a:r>
+            <a:br>
+              <a:rPr lang="en-US" dirty="0"/>
+            </a:br>
+            <a:r>
+              <a:rPr lang="en-US" dirty="0"/>
+              <a:t>right 200:1100</a:t>
+            </a:r>
+            <a:endParaRPr lang="en-SG" dirty="0"/>
+          </a:p>
+        </p:txBody>
+      </p:sp>
+      <p:pic>
+        <p:nvPicPr>
+          <p:cNvPr id="5" name="Content Placeholder 4">
+            <a:extLst>
+              <a:ext uri="{FF2B5EF4-FFF2-40B4-BE49-F238E27FC236}">
+                <a16:creationId xmlns:a16="http://schemas.microsoft.com/office/drawing/2014/main" id="{75B7B125-732E-4A14-98BF-0FC2399D3211}"/>
+              </a:ext>
+            </a:extLst>
+          </p:cNvPr>
+          <p:cNvPicPr>
+            <a:picLocks noGrp="1" noChangeAspect="1"/>
+          </p:cNvPicPr>
+          <p:nvPr>
+            <p:ph idx="1"/>
+          </p:nvPr>
+        </p:nvPicPr>
+        <p:blipFill>
+          <a:blip r:embed="rId2"/>
+          <a:stretch>
+            <a:fillRect/>
+          </a:stretch>
+        </p:blipFill>
+        <p:spPr>
+          <a:xfrm>
+            <a:off x="5546445" y="116125"/>
+            <a:ext cx="2722911" cy="6625750"/>
+          </a:xfrm>
+        </p:spPr>
+      </p:pic>
+      <p:pic>
+        <p:nvPicPr>
+          <p:cNvPr id="7" name="Picture 6">
+            <a:extLst>
+              <a:ext uri="{FF2B5EF4-FFF2-40B4-BE49-F238E27FC236}">
+                <a16:creationId xmlns:a16="http://schemas.microsoft.com/office/drawing/2014/main" id="{E6668955-5DA7-42B7-B711-43C47B6B70C4}"/>
+              </a:ext>
+            </a:extLst>
+          </p:cNvPr>
+          <p:cNvPicPr>
+            <a:picLocks noChangeAspect="1"/>
+          </p:cNvPicPr>
+          <p:nvPr/>
+        </p:nvPicPr>
+        <p:blipFill>
+          <a:blip r:embed="rId3"/>
+          <a:stretch>
+            <a:fillRect/>
+          </a:stretch>
+        </p:blipFill>
+        <p:spPr>
+          <a:xfrm>
+            <a:off x="8496026" y="116125"/>
+            <a:ext cx="2722911" cy="6531746"/>
+          </a:xfrm>
+          <a:prstGeom prst="rect">
+            <a:avLst/>
+          </a:prstGeom>
+        </p:spPr>
+      </p:pic>
+    </p:spTree>
+    <p:extLst>
+      <p:ext uri="{BB962C8B-B14F-4D97-AF65-F5344CB8AC3E}">
+        <p14:creationId xmlns:p14="http://schemas.microsoft.com/office/powerpoint/2010/main" val="4023113290"/>
+      </p:ext>
+    </p:extLst>
+  </p:cSld>
+  <p:clrMapOvr>
+    <a:masterClrMapping/>
+  </p:clrMapOvr>
+</p:sld>
+</file>
+
+<file path=ppt/slides/slide5.xml><?xml version="1.0" encoding="utf-8"?>
+<p:sld xmlns:a="http://schemas.openxmlformats.org/drawingml/2006/main" xmlns:r="http://schemas.openxmlformats.org/officeDocument/2006/relationships" xmlns:p="http://schemas.openxmlformats.org/presentationml/2006/main">
+  <p:cSld>
+    <p:spTree>
+      <p:nvGrpSpPr>
+        <p:cNvPr id="1" name=""/>
+        <p:cNvGrpSpPr/>
+        <p:nvPr/>
+      </p:nvGrpSpPr>
+      <p:grpSpPr>
+        <a:xfrm>
+          <a:off x="0" y="0"/>
+          <a:ext cx="0" cy="0"/>
+          <a:chOff x="0" y="0"/>
+          <a:chExt cx="0" cy="0"/>
+        </a:xfrm>
+      </p:grpSpPr>
+      <p:sp>
+        <p:nvSpPr>
+          <p:cNvPr id="2" name="Title 1">
+            <a:extLst>
+              <a:ext uri="{FF2B5EF4-FFF2-40B4-BE49-F238E27FC236}">
+                <a16:creationId xmlns:a16="http://schemas.microsoft.com/office/drawing/2014/main" id="{34B26EE9-7F7D-4D94-8646-921AF6D0918B}"/>
+              </a:ext>
+            </a:extLst>
+          </p:cNvPr>
+          <p:cNvSpPr>
+            <a:spLocks noGrp="1"/>
+          </p:cNvSpPr>
+          <p:nvPr>
+            <p:ph type="title"/>
+          </p:nvPr>
+        </p:nvSpPr>
+        <p:spPr/>
+        <p:txBody>
+          <a:bodyPr>
+            <a:normAutofit fontScale="90000"/>
+          </a:bodyPr>
+          <a:lstStyle/>
+          <a:p>
+            <a:r>
+              <a:rPr lang="en-US" dirty="0"/>
+              <a:t>Res18 250:1100</a:t>
+            </a:r>
+            <a:br>
+              <a:rPr lang="en-US" dirty="0"/>
+            </a:br>
+            <a:r>
+              <a:rPr lang="en-US" dirty="0"/>
+              <a:t>left batch:5</a:t>
+            </a:r>
+            <a:br>
+              <a:rPr lang="en-US" dirty="0"/>
+            </a:br>
+            <a:r>
+              <a:rPr lang="en-US" dirty="0"/>
+              <a:t>right batch:10</a:t>
+            </a:r>
+            <a:endParaRPr lang="en-SG" dirty="0"/>
+          </a:p>
+        </p:txBody>
+      </p:sp>
+      <p:sp>
+        <p:nvSpPr>
+          <p:cNvPr id="3" name="Content Placeholder 2">
+            <a:extLst>
+              <a:ext uri="{FF2B5EF4-FFF2-40B4-BE49-F238E27FC236}">
+                <a16:creationId xmlns:a16="http://schemas.microsoft.com/office/drawing/2014/main" id="{1E35E29D-7295-4AA0-8109-959324BE716C}"/>
+              </a:ext>
+            </a:extLst>
+          </p:cNvPr>
+          <p:cNvSpPr>
+            <a:spLocks noGrp="1"/>
+          </p:cNvSpPr>
+          <p:nvPr>
+            <p:ph idx="1"/>
+          </p:nvPr>
+        </p:nvSpPr>
+        <p:spPr/>
+        <p:txBody>
+          <a:bodyPr/>
+          <a:lstStyle/>
+          <a:p>
+            <a:endParaRPr lang="en-SG"/>
+          </a:p>
+        </p:txBody>
+      </p:sp>
+      <p:pic>
+        <p:nvPicPr>
+          <p:cNvPr id="5" name="Picture 4">
+            <a:extLst>
+              <a:ext uri="{FF2B5EF4-FFF2-40B4-BE49-F238E27FC236}">
+                <a16:creationId xmlns:a16="http://schemas.microsoft.com/office/drawing/2014/main" id="{17CF8F20-8923-4AB9-8813-8029E0FA691B}"/>
+              </a:ext>
+            </a:extLst>
+          </p:cNvPr>
+          <p:cNvPicPr>
+            <a:picLocks noChangeAspect="1"/>
+          </p:cNvPicPr>
+          <p:nvPr/>
+        </p:nvPicPr>
+        <p:blipFill>
+          <a:blip r:embed="rId2"/>
+          <a:stretch>
+            <a:fillRect/>
+          </a:stretch>
+        </p:blipFill>
+        <p:spPr>
+          <a:xfrm>
+            <a:off x="5334961" y="183390"/>
+            <a:ext cx="2814640" cy="6309485"/>
+          </a:xfrm>
+          <a:prstGeom prst="rect">
+            <a:avLst/>
+          </a:prstGeom>
+        </p:spPr>
+      </p:pic>
+      <p:pic>
+        <p:nvPicPr>
+          <p:cNvPr id="7" name="Picture 6">
+            <a:extLst>
+              <a:ext uri="{FF2B5EF4-FFF2-40B4-BE49-F238E27FC236}">
+                <a16:creationId xmlns:a16="http://schemas.microsoft.com/office/drawing/2014/main" id="{5C2A9FA9-4BFB-4D6D-A7F7-A645C842C6D9}"/>
+              </a:ext>
+            </a:extLst>
+          </p:cNvPr>
+          <p:cNvPicPr>
+            <a:picLocks noChangeAspect="1"/>
+          </p:cNvPicPr>
+          <p:nvPr/>
+        </p:nvPicPr>
+        <p:blipFill>
+          <a:blip r:embed="rId3"/>
+          <a:stretch>
+            <a:fillRect/>
+          </a:stretch>
+        </p:blipFill>
+        <p:spPr>
+          <a:xfrm>
+            <a:off x="8413424" y="183390"/>
+            <a:ext cx="2786107" cy="6309485"/>
+          </a:xfrm>
+          <a:prstGeom prst="rect">
+            <a:avLst/>
+          </a:prstGeom>
+        </p:spPr>
+      </p:pic>
+    </p:spTree>
+    <p:extLst>
+      <p:ext uri="{BB962C8B-B14F-4D97-AF65-F5344CB8AC3E}">
+        <p14:creationId xmlns:p14="http://schemas.microsoft.com/office/powerpoint/2010/main" val="3375843686"/>
+      </p:ext>
+    </p:extLst>
+  </p:cSld>
+  <p:clrMapOvr>
+    <a:masterClrMapping/>
+  </p:clrMapOvr>
+</p:sld>
+</file>
+
 <file path=ppt/theme/theme1.xml><?xml version="1.0" encoding="utf-8"?>
 <a:theme xmlns:a="http://schemas.openxmlformats.org/drawingml/2006/main" name="Office Theme">
   <a:themeElements>

</xml_diff>

<commit_message>
added test accuracy code
</commit_message>
<xml_diff>
--- a/REsults.pptx
+++ b/REsults.pptx
@@ -10,6 +10,7 @@
     <p:sldId id="258" r:id="rId4"/>
     <p:sldId id="259" r:id="rId5"/>
     <p:sldId id="260" r:id="rId6"/>
+    <p:sldId id="261" r:id="rId7"/>
   </p:sldIdLst>
   <p:sldSz cx="12192000" cy="6858000"/>
   <p:notesSz cx="6858000" cy="9144000"/>
@@ -3846,7 +3847,11 @@
           <a:bodyPr/>
           <a:lstStyle/>
           <a:p>
-            <a:endParaRPr lang="en-SG"/>
+            <a:r>
+              <a:rPr lang="en-US" dirty="0"/>
+              <a:t>Lr = 0.01</a:t>
+            </a:r>
+            <a:endParaRPr lang="en-SG" dirty="0"/>
           </a:p>
         </p:txBody>
       </p:sp>
@@ -3872,7 +3877,7 @@
         </p:blipFill>
         <p:spPr>
           <a:xfrm>
-            <a:off x="5334961" y="183390"/>
+            <a:off x="4341048" y="183389"/>
             <a:ext cx="2814640" cy="6309485"/>
           </a:xfrm>
           <a:prstGeom prst="rect">
@@ -3902,7 +3907,7 @@
         </p:blipFill>
         <p:spPr>
           <a:xfrm>
-            <a:off x="8413424" y="183390"/>
+            <a:off x="7273737" y="193328"/>
             <a:ext cx="2786107" cy="6309485"/>
           </a:xfrm>
           <a:prstGeom prst="rect">
@@ -3914,6 +3919,161 @@
     <p:extLst>
       <p:ext uri="{BB962C8B-B14F-4D97-AF65-F5344CB8AC3E}">
         <p14:creationId xmlns:p14="http://schemas.microsoft.com/office/powerpoint/2010/main" val="3375843686"/>
+      </p:ext>
+    </p:extLst>
+  </p:cSld>
+  <p:clrMapOvr>
+    <a:masterClrMapping/>
+  </p:clrMapOvr>
+</p:sld>
+</file>
+
+<file path=ppt/slides/slide6.xml><?xml version="1.0" encoding="utf-8"?>
+<p:sld xmlns:a="http://schemas.openxmlformats.org/drawingml/2006/main" xmlns:r="http://schemas.openxmlformats.org/officeDocument/2006/relationships" xmlns:p="http://schemas.openxmlformats.org/presentationml/2006/main">
+  <p:cSld>
+    <p:spTree>
+      <p:nvGrpSpPr>
+        <p:cNvPr id="1" name=""/>
+        <p:cNvGrpSpPr/>
+        <p:nvPr/>
+      </p:nvGrpSpPr>
+      <p:grpSpPr>
+        <a:xfrm>
+          <a:off x="0" y="0"/>
+          <a:ext cx="0" cy="0"/>
+          <a:chOff x="0" y="0"/>
+          <a:chExt cx="0" cy="0"/>
+        </a:xfrm>
+      </p:grpSpPr>
+      <p:sp>
+        <p:nvSpPr>
+          <p:cNvPr id="2" name="Title 1">
+            <a:extLst>
+              <a:ext uri="{FF2B5EF4-FFF2-40B4-BE49-F238E27FC236}">
+                <a16:creationId xmlns:a16="http://schemas.microsoft.com/office/drawing/2014/main" id="{25FD6DCE-C83B-4BF0-BA56-CF4759C518E2}"/>
+              </a:ext>
+            </a:extLst>
+          </p:cNvPr>
+          <p:cNvSpPr>
+            <a:spLocks noGrp="1"/>
+          </p:cNvSpPr>
+          <p:nvPr>
+            <p:ph type="title"/>
+          </p:nvPr>
+        </p:nvSpPr>
+        <p:spPr/>
+        <p:txBody>
+          <a:bodyPr/>
+          <a:lstStyle/>
+          <a:p>
+            <a:r>
+              <a:rPr lang="en-US" dirty="0"/>
+              <a:t>LR = 0.001</a:t>
+            </a:r>
+            <a:br>
+              <a:rPr lang="en-US" dirty="0"/>
+            </a:br>
+            <a:r>
+              <a:rPr lang="en-US" dirty="0"/>
+              <a:t>50 vs </a:t>
+            </a:r>
+            <a:r>
+              <a:rPr lang="en-US"/>
+              <a:t>80 epoch</a:t>
+            </a:r>
+            <a:endParaRPr lang="en-SG" dirty="0"/>
+          </a:p>
+        </p:txBody>
+      </p:sp>
+      <p:sp>
+        <p:nvSpPr>
+          <p:cNvPr id="3" name="Content Placeholder 2">
+            <a:extLst>
+              <a:ext uri="{FF2B5EF4-FFF2-40B4-BE49-F238E27FC236}">
+                <a16:creationId xmlns:a16="http://schemas.microsoft.com/office/drawing/2014/main" id="{05650599-3135-4417-91D0-85CE312F1EFF}"/>
+              </a:ext>
+            </a:extLst>
+          </p:cNvPr>
+          <p:cNvSpPr>
+            <a:spLocks noGrp="1"/>
+          </p:cNvSpPr>
+          <p:nvPr>
+            <p:ph idx="1"/>
+          </p:nvPr>
+        </p:nvSpPr>
+        <p:spPr/>
+        <p:txBody>
+          <a:bodyPr/>
+          <a:lstStyle/>
+          <a:p>
+            <a:endParaRPr lang="en-SG" dirty="0"/>
+          </a:p>
+        </p:txBody>
+      </p:sp>
+      <p:pic>
+        <p:nvPicPr>
+          <p:cNvPr id="5" name="Picture 4">
+            <a:extLst>
+              <a:ext uri="{FF2B5EF4-FFF2-40B4-BE49-F238E27FC236}">
+                <a16:creationId xmlns:a16="http://schemas.microsoft.com/office/drawing/2014/main" id="{97B8A757-1123-4826-99EA-D830BF346F3D}"/>
+              </a:ext>
+            </a:extLst>
+          </p:cNvPr>
+          <p:cNvPicPr>
+            <a:picLocks noChangeAspect="1"/>
+          </p:cNvPicPr>
+          <p:nvPr/>
+        </p:nvPicPr>
+        <p:blipFill>
+          <a:blip r:embed="rId2"/>
+          <a:stretch>
+            <a:fillRect/>
+          </a:stretch>
+        </p:blipFill>
+        <p:spPr>
+          <a:xfrm>
+            <a:off x="4548663" y="0"/>
+            <a:ext cx="3094673" cy="6858000"/>
+          </a:xfrm>
+          <a:prstGeom prst="rect">
+            <a:avLst/>
+          </a:prstGeom>
+        </p:spPr>
+      </p:pic>
+      <p:pic>
+        <p:nvPicPr>
+          <p:cNvPr id="7" name="Picture 6">
+            <a:extLst>
+              <a:ext uri="{FF2B5EF4-FFF2-40B4-BE49-F238E27FC236}">
+                <a16:creationId xmlns:a16="http://schemas.microsoft.com/office/drawing/2014/main" id="{53748E60-F216-46EA-808A-242A5AB4DF9B}"/>
+              </a:ext>
+            </a:extLst>
+          </p:cNvPr>
+          <p:cNvPicPr>
+            <a:picLocks noChangeAspect="1"/>
+          </p:cNvPicPr>
+          <p:nvPr/>
+        </p:nvPicPr>
+        <p:blipFill>
+          <a:blip r:embed="rId3"/>
+          <a:stretch>
+            <a:fillRect/>
+          </a:stretch>
+        </p:blipFill>
+        <p:spPr>
+          <a:xfrm>
+            <a:off x="7863011" y="0"/>
+            <a:ext cx="2323437" cy="6858000"/>
+          </a:xfrm>
+          <a:prstGeom prst="rect">
+            <a:avLst/>
+          </a:prstGeom>
+        </p:spPr>
+      </p:pic>
+    </p:spTree>
+    <p:extLst>
+      <p:ext uri="{BB962C8B-B14F-4D97-AF65-F5344CB8AC3E}">
+        <p14:creationId xmlns:p14="http://schemas.microsoft.com/office/powerpoint/2010/main" val="2156360420"/>
       </p:ext>
     </p:extLst>
   </p:cSld>

</xml_diff>